<commit_message>
Updated presentation 4 . Typescript
</commit_message>
<xml_diff>
--- a/Angular/04. TypeScript/4.TS - deep dive.pptx
+++ b/Angular/04. TypeScript/4.TS - deep dive.pptx
@@ -10817,7 +10817,7 @@
           </a:bodyPr>
           <a:lstStyle/>
           <a:p>
-            <a:pPr indent="0" lvl="0" marL="0" algn="ctr">
+            <a:pPr indent="0" lvl="0" marL="0">
               <a:spcBef>
                 <a:spcPts val="0"/>
               </a:spcBef>
@@ -10827,22 +10827,13 @@
               <a:buNone/>
             </a:pPr>
             <a:r>
-              <a:t/>
-            </a:r>
-            <a:endParaRPr/>
-          </a:p>
-          <a:p>
-            <a:pPr indent="0" lvl="0" marL="0" algn="ctr">
-              <a:spcBef>
-                <a:spcPts val="1600"/>
-              </a:spcBef>
-              <a:spcAft>
-                <a:spcPts val="0"/>
-              </a:spcAft>
-              <a:buNone/>
-            </a:pPr>
-            <a:r>
-              <a:t/>
+              <a:rPr lang="ro" u="sng">
+                <a:solidFill>
+                  <a:schemeClr val="hlink"/>
+                </a:solidFill>
+                <a:hlinkClick r:id="rId3"/>
+              </a:rPr>
+              <a:t>https://github.com/typestack/class-validator</a:t>
             </a:r>
             <a:endParaRPr/>
           </a:p>
@@ -10861,9 +10852,13 @@
                 <a:solidFill>
                   <a:schemeClr val="hlink"/>
                 </a:solidFill>
-                <a:hlinkClick r:id="rId3"/>
-              </a:rPr>
-              <a:t>https://github.com/typestack/class-validator</a:t>
+                <a:hlinkClick r:id="rId4"/>
+              </a:rPr>
+              <a:t>https://cabbageapps.com/fell-love-js-decorators/</a:t>
+            </a:r>
+            <a:r>
+              <a:rPr lang="ro"/>
+              <a:t> </a:t>
             </a:r>
             <a:endParaRPr/>
           </a:p>
@@ -10873,7 +10868,32 @@
                 <a:spcPts val="1600"/>
               </a:spcBef>
               <a:spcAft>
+                <a:spcPts val="0"/>
+              </a:spcAft>
+              <a:buNone/>
+            </a:pPr>
+            <a:r>
+              <a:rPr lang="ro" u="sng">
+                <a:solidFill>
+                  <a:schemeClr val="hlink"/>
+                </a:solidFill>
+                <a:hlinkClick r:id="rId5"/>
+              </a:rPr>
+              <a:t>https://www.spectory.com/blog/A%20deep%20dive%20into%20TypeScript%20decorators</a:t>
+            </a:r>
+            <a:r>
+              <a:rPr lang="ro"/>
+              <a:t> </a:t>
+            </a:r>
+            <a:endParaRPr/>
+          </a:p>
+          <a:p>
+            <a:pPr indent="0" lvl="0" marL="0">
+              <a:spcBef>
                 <a:spcPts val="1600"/>
+              </a:spcBef>
+              <a:spcAft>
+                <a:spcPts val="0"/>
               </a:spcAft>
               <a:buNone/>
             </a:pPr>
@@ -10882,13 +10902,63 @@
                 <a:solidFill>
                   <a:schemeClr val="hlink"/>
                 </a:solidFill>
-                <a:hlinkClick r:id="rId4"/>
-              </a:rPr>
-              <a:t>https://cabbageapps.com/fell-love-js-decorators/</a:t>
+                <a:hlinkClick r:id="rId6"/>
+              </a:rPr>
+              <a:t>https://www.sparkbit.pl/typescript-decorators/</a:t>
             </a:r>
             <a:r>
               <a:rPr lang="ro"/>
               <a:t>  </a:t>
+            </a:r>
+            <a:endParaRPr/>
+          </a:p>
+          <a:p>
+            <a:pPr indent="0" lvl="0" marL="0">
+              <a:spcBef>
+                <a:spcPts val="1600"/>
+              </a:spcBef>
+              <a:spcAft>
+                <a:spcPts val="0"/>
+              </a:spcAft>
+              <a:buNone/>
+            </a:pPr>
+            <a:r>
+              <a:rPr lang="ro" u="sng">
+                <a:solidFill>
+                  <a:schemeClr val="hlink"/>
+                </a:solidFill>
+                <a:hlinkClick r:id="rId7"/>
+              </a:rPr>
+              <a:t>http://blog.wolksoftware.com/decorators-metadata-reflection-in-typescript-from-novice-to-expert-part-3</a:t>
+            </a:r>
+            <a:r>
+              <a:rPr lang="ro"/>
+              <a:t> </a:t>
+            </a:r>
+            <a:endParaRPr/>
+          </a:p>
+          <a:p>
+            <a:pPr indent="0" lvl="0" marL="0">
+              <a:spcBef>
+                <a:spcPts val="1600"/>
+              </a:spcBef>
+              <a:spcAft>
+                <a:spcPts val="1600"/>
+              </a:spcAft>
+              <a:buNone/>
+            </a:pPr>
+            <a:r>
+              <a:rPr lang="ro" u="sng">
+                <a:solidFill>
+                  <a:schemeClr val="hlink"/>
+                </a:solidFill>
+                <a:hlinkClick r:id="rId8"/>
+              </a:rPr>
+              <a:t>https://netbasal.com/create-and-test-decorators-in-javascript-85e8d5cf879c</a:t>
+            </a:r>
+            <a:r>
+              <a:rPr lang="ro"/>
+              <a:t> </a:t>
             </a:r>
             <a:endParaRPr/>
           </a:p>

</xml_diff>